<commit_message>
Update MAJ Last meeting
</commit_message>
<xml_diff>
--- a/organigramme_assoc.pptx
+++ b/organigramme_assoc.pptx
@@ -6,6 +6,7 @@
   </p:sldMasterIdLst>
   <p:sldIdLst>
     <p:sldId id="256" r:id="rId2"/>
+    <p:sldId id="257" r:id="rId3"/>
   </p:sldIdLst>
   <p:sldSz cx="9144000" cy="6858000" type="screen4x3"/>
   <p:notesSz cx="6858000" cy="9144000"/>
@@ -288,7 +289,7 @@
           <a:p>
             <a:fld id="{49A745A8-587A-4BE2-BD0D-EDC5F0B46F96}" type="datetimeFigureOut">
               <a:rPr lang="fr-FR" smtClean="0"/>
-              <a:t>19/02/2015</a:t>
+              <a:t>18/03/2015</a:t>
             </a:fld>
             <a:endParaRPr lang="fr-FR"/>
           </a:p>
@@ -458,7 +459,7 @@
           <a:p>
             <a:fld id="{49A745A8-587A-4BE2-BD0D-EDC5F0B46F96}" type="datetimeFigureOut">
               <a:rPr lang="fr-FR" smtClean="0"/>
-              <a:t>19/02/2015</a:t>
+              <a:t>18/03/2015</a:t>
             </a:fld>
             <a:endParaRPr lang="fr-FR"/>
           </a:p>
@@ -638,7 +639,7 @@
           <a:p>
             <a:fld id="{49A745A8-587A-4BE2-BD0D-EDC5F0B46F96}" type="datetimeFigureOut">
               <a:rPr lang="fr-FR" smtClean="0"/>
-              <a:t>19/02/2015</a:t>
+              <a:t>18/03/2015</a:t>
             </a:fld>
             <a:endParaRPr lang="fr-FR"/>
           </a:p>
@@ -808,7 +809,7 @@
           <a:p>
             <a:fld id="{49A745A8-587A-4BE2-BD0D-EDC5F0B46F96}" type="datetimeFigureOut">
               <a:rPr lang="fr-FR" smtClean="0"/>
-              <a:t>19/02/2015</a:t>
+              <a:t>18/03/2015</a:t>
             </a:fld>
             <a:endParaRPr lang="fr-FR"/>
           </a:p>
@@ -1054,7 +1055,7 @@
           <a:p>
             <a:fld id="{49A745A8-587A-4BE2-BD0D-EDC5F0B46F96}" type="datetimeFigureOut">
               <a:rPr lang="fr-FR" smtClean="0"/>
-              <a:t>19/02/2015</a:t>
+              <a:t>18/03/2015</a:t>
             </a:fld>
             <a:endParaRPr lang="fr-FR"/>
           </a:p>
@@ -1342,7 +1343,7 @@
           <a:p>
             <a:fld id="{49A745A8-587A-4BE2-BD0D-EDC5F0B46F96}" type="datetimeFigureOut">
               <a:rPr lang="fr-FR" smtClean="0"/>
-              <a:t>19/02/2015</a:t>
+              <a:t>18/03/2015</a:t>
             </a:fld>
             <a:endParaRPr lang="fr-FR"/>
           </a:p>
@@ -1764,7 +1765,7 @@
           <a:p>
             <a:fld id="{49A745A8-587A-4BE2-BD0D-EDC5F0B46F96}" type="datetimeFigureOut">
               <a:rPr lang="fr-FR" smtClean="0"/>
-              <a:t>19/02/2015</a:t>
+              <a:t>18/03/2015</a:t>
             </a:fld>
             <a:endParaRPr lang="fr-FR"/>
           </a:p>
@@ -1882,7 +1883,7 @@
           <a:p>
             <a:fld id="{49A745A8-587A-4BE2-BD0D-EDC5F0B46F96}" type="datetimeFigureOut">
               <a:rPr lang="fr-FR" smtClean="0"/>
-              <a:t>19/02/2015</a:t>
+              <a:t>18/03/2015</a:t>
             </a:fld>
             <a:endParaRPr lang="fr-FR"/>
           </a:p>
@@ -1977,7 +1978,7 @@
           <a:p>
             <a:fld id="{49A745A8-587A-4BE2-BD0D-EDC5F0B46F96}" type="datetimeFigureOut">
               <a:rPr lang="fr-FR" smtClean="0"/>
-              <a:t>19/02/2015</a:t>
+              <a:t>18/03/2015</a:t>
             </a:fld>
             <a:endParaRPr lang="fr-FR"/>
           </a:p>
@@ -2254,7 +2255,7 @@
           <a:p>
             <a:fld id="{49A745A8-587A-4BE2-BD0D-EDC5F0B46F96}" type="datetimeFigureOut">
               <a:rPr lang="fr-FR" smtClean="0"/>
-              <a:t>19/02/2015</a:t>
+              <a:t>18/03/2015</a:t>
             </a:fld>
             <a:endParaRPr lang="fr-FR"/>
           </a:p>
@@ -2507,7 +2508,7 @@
           <a:p>
             <a:fld id="{49A745A8-587A-4BE2-BD0D-EDC5F0B46F96}" type="datetimeFigureOut">
               <a:rPr lang="fr-FR" smtClean="0"/>
-              <a:t>19/02/2015</a:t>
+              <a:t>18/03/2015</a:t>
             </a:fld>
             <a:endParaRPr lang="fr-FR"/>
           </a:p>
@@ -2727,7 +2728,7 @@
           <a:p>
             <a:fld id="{49A745A8-587A-4BE2-BD0D-EDC5F0B46F96}" type="datetimeFigureOut">
               <a:rPr lang="fr-FR" smtClean="0"/>
-              <a:t>19/02/2015</a:t>
+              <a:t>18/03/2015</a:t>
             </a:fld>
             <a:endParaRPr lang="fr-FR"/>
           </a:p>
@@ -4227,6 +4228,1124 @@
     <p:extLst>
       <p:ext uri="{BB962C8B-B14F-4D97-AF65-F5344CB8AC3E}">
         <p14:creationId xmlns:p14="http://schemas.microsoft.com/office/powerpoint/2010/main" val="4017978145"/>
+      </p:ext>
+    </p:extLst>
+  </p:cSld>
+  <p:clrMapOvr>
+    <a:masterClrMapping/>
+  </p:clrMapOvr>
+  <p:timing>
+    <p:tnLst>
+      <p:par>
+        <p:cTn id="1" dur="indefinite" restart="never" nodeType="tmRoot"/>
+      </p:par>
+    </p:tnLst>
+  </p:timing>
+</p:sld>
+</file>
+
+<file path=ppt/slides/slide2.xml><?xml version="1.0" encoding="utf-8"?>
+<p:sld xmlns:a="http://schemas.openxmlformats.org/drawingml/2006/main" xmlns:r="http://schemas.openxmlformats.org/officeDocument/2006/relationships" xmlns:p="http://schemas.openxmlformats.org/presentationml/2006/main">
+  <p:cSld>
+    <p:spTree>
+      <p:nvGrpSpPr>
+        <p:cNvPr id="1" name=""/>
+        <p:cNvGrpSpPr/>
+        <p:nvPr/>
+      </p:nvGrpSpPr>
+      <p:grpSpPr>
+        <a:xfrm>
+          <a:off x="0" y="0"/>
+          <a:ext cx="0" cy="0"/>
+          <a:chOff x="0" y="0"/>
+          <a:chExt cx="0" cy="0"/>
+        </a:xfrm>
+      </p:grpSpPr>
+      <p:sp>
+        <p:nvSpPr>
+          <p:cNvPr id="4" name="Rectangle à coins arrondis 3"/>
+          <p:cNvSpPr/>
+          <p:nvPr/>
+        </p:nvSpPr>
+        <p:spPr>
+          <a:xfrm>
+            <a:off x="3710899" y="3013720"/>
+            <a:ext cx="1974528" cy="936104"/>
+          </a:xfrm>
+          <a:prstGeom prst="roundRect">
+            <a:avLst/>
+          </a:prstGeom>
+          <a:solidFill>
+            <a:schemeClr val="bg1">
+              <a:lumMod val="95000"/>
+            </a:schemeClr>
+          </a:solidFill>
+          <a:ln w="6350">
+            <a:solidFill>
+              <a:schemeClr val="bg2">
+                <a:lumMod val="90000"/>
+              </a:schemeClr>
+            </a:solidFill>
+          </a:ln>
+        </p:spPr>
+        <p:style>
+          <a:lnRef idx="2">
+            <a:schemeClr val="accent1">
+              <a:shade val="50000"/>
+            </a:schemeClr>
+          </a:lnRef>
+          <a:fillRef idx="1">
+            <a:schemeClr val="accent1"/>
+          </a:fillRef>
+          <a:effectRef idx="0">
+            <a:schemeClr val="accent1"/>
+          </a:effectRef>
+          <a:fontRef idx="minor">
+            <a:schemeClr val="lt1"/>
+          </a:fontRef>
+        </p:style>
+        <p:txBody>
+          <a:bodyPr rtlCol="0" anchor="ctr"/>
+          <a:lstStyle/>
+          <a:p>
+            <a:pPr algn="ctr"/>
+            <a:r>
+              <a:rPr lang="fr-FR" sz="1600" dirty="0" smtClean="0">
+                <a:solidFill>
+                  <a:schemeClr val="accent6">
+                    <a:lumMod val="75000"/>
+                  </a:schemeClr>
+                </a:solidFill>
+              </a:rPr>
+              <a:t>Entraineur</a:t>
+            </a:r>
+            <a:endParaRPr lang="fr-FR" sz="1600" dirty="0">
+              <a:solidFill>
+                <a:schemeClr val="accent6">
+                  <a:lumMod val="75000"/>
+                </a:schemeClr>
+              </a:solidFill>
+            </a:endParaRPr>
+          </a:p>
+          <a:p>
+            <a:pPr algn="ctr"/>
+            <a:r>
+              <a:rPr lang="fr-FR" sz="1600" dirty="0">
+                <a:solidFill>
+                  <a:schemeClr val="tx1">
+                    <a:lumMod val="75000"/>
+                    <a:lumOff val="25000"/>
+                  </a:schemeClr>
+                </a:solidFill>
+              </a:rPr>
+              <a:t>-</a:t>
+            </a:r>
+          </a:p>
+          <a:p>
+            <a:pPr algn="ctr"/>
+            <a:r>
+              <a:rPr lang="fr-FR" sz="1600" b="1" dirty="0" smtClean="0">
+                <a:solidFill>
+                  <a:schemeClr val="accent1">
+                    <a:lumMod val="75000"/>
+                  </a:schemeClr>
+                </a:solidFill>
+              </a:rPr>
+              <a:t>Yves Ferrari</a:t>
+            </a:r>
+            <a:endParaRPr lang="fr-FR" sz="1600" b="1" dirty="0">
+              <a:solidFill>
+                <a:schemeClr val="accent1">
+                  <a:lumMod val="75000"/>
+                </a:schemeClr>
+              </a:solidFill>
+            </a:endParaRPr>
+          </a:p>
+        </p:txBody>
+      </p:sp>
+      <p:sp>
+        <p:nvSpPr>
+          <p:cNvPr id="7" name="Rectangle à coins arrondis 6"/>
+          <p:cNvSpPr/>
+          <p:nvPr/>
+        </p:nvSpPr>
+        <p:spPr>
+          <a:xfrm>
+            <a:off x="747912" y="256332"/>
+            <a:ext cx="2023888" cy="1219944"/>
+          </a:xfrm>
+          <a:prstGeom prst="roundRect">
+            <a:avLst/>
+          </a:prstGeom>
+          <a:solidFill>
+            <a:schemeClr val="bg1">
+              <a:lumMod val="95000"/>
+            </a:schemeClr>
+          </a:solidFill>
+          <a:ln w="6350">
+            <a:solidFill>
+              <a:schemeClr val="bg2">
+                <a:lumMod val="90000"/>
+              </a:schemeClr>
+            </a:solidFill>
+          </a:ln>
+        </p:spPr>
+        <p:style>
+          <a:lnRef idx="2">
+            <a:schemeClr val="accent1">
+              <a:shade val="50000"/>
+            </a:schemeClr>
+          </a:lnRef>
+          <a:fillRef idx="1">
+            <a:schemeClr val="accent1"/>
+          </a:fillRef>
+          <a:effectRef idx="0">
+            <a:schemeClr val="accent1"/>
+          </a:effectRef>
+          <a:fontRef idx="minor">
+            <a:schemeClr val="lt1"/>
+          </a:fontRef>
+        </p:style>
+        <p:txBody>
+          <a:bodyPr rtlCol="0" anchor="ctr"/>
+          <a:lstStyle/>
+          <a:p>
+            <a:pPr algn="ctr"/>
+            <a:endParaRPr lang="fr-FR" sz="1600" dirty="0" smtClean="0">
+              <a:solidFill>
+                <a:schemeClr val="tx1">
+                  <a:lumMod val="75000"/>
+                  <a:lumOff val="25000"/>
+                </a:schemeClr>
+              </a:solidFill>
+            </a:endParaRPr>
+          </a:p>
+          <a:p>
+            <a:pPr algn="ctr"/>
+            <a:r>
+              <a:rPr lang="fr-FR" sz="1600" dirty="0" smtClean="0">
+                <a:solidFill>
+                  <a:schemeClr val="accent6">
+                    <a:lumMod val="75000"/>
+                  </a:schemeClr>
+                </a:solidFill>
+              </a:rPr>
+              <a:t>Capitaine  / Tactique</a:t>
+            </a:r>
+            <a:endParaRPr lang="fr-FR" sz="1600" dirty="0" smtClean="0">
+              <a:solidFill>
+                <a:schemeClr val="accent6">
+                  <a:lumMod val="75000"/>
+                </a:schemeClr>
+              </a:solidFill>
+            </a:endParaRPr>
+          </a:p>
+          <a:p>
+            <a:pPr algn="ctr"/>
+            <a:r>
+              <a:rPr lang="fr-FR" sz="1600" dirty="0" smtClean="0">
+                <a:solidFill>
+                  <a:schemeClr val="tx1">
+                    <a:lumMod val="75000"/>
+                    <a:lumOff val="25000"/>
+                  </a:schemeClr>
+                </a:solidFill>
+              </a:rPr>
+              <a:t>-</a:t>
+            </a:r>
+          </a:p>
+          <a:p>
+            <a:pPr algn="ctr"/>
+            <a:r>
+              <a:rPr lang="fr-FR" sz="1600" b="1" dirty="0" smtClean="0">
+                <a:solidFill>
+                  <a:schemeClr val="accent1">
+                    <a:lumMod val="75000"/>
+                  </a:schemeClr>
+                </a:solidFill>
+              </a:rPr>
+              <a:t>Thibaut </a:t>
+            </a:r>
+            <a:r>
+              <a:rPr lang="fr-FR" sz="1600" b="1" dirty="0" err="1" smtClean="0">
+                <a:solidFill>
+                  <a:schemeClr val="accent1">
+                    <a:lumMod val="75000"/>
+                  </a:schemeClr>
+                </a:solidFill>
+              </a:rPr>
+              <a:t>Chaize</a:t>
+            </a:r>
+            <a:endParaRPr lang="fr-FR" sz="1600" b="1" dirty="0" smtClean="0">
+              <a:solidFill>
+                <a:schemeClr val="accent1">
+                  <a:lumMod val="75000"/>
+                </a:schemeClr>
+              </a:solidFill>
+            </a:endParaRPr>
+          </a:p>
+          <a:p>
+            <a:pPr algn="ctr"/>
+            <a:endParaRPr lang="fr-FR" dirty="0" smtClean="0">
+              <a:solidFill>
+                <a:schemeClr val="tx1">
+                  <a:lumMod val="75000"/>
+                  <a:lumOff val="25000"/>
+                </a:schemeClr>
+              </a:solidFill>
+            </a:endParaRPr>
+          </a:p>
+        </p:txBody>
+      </p:sp>
+      <p:sp>
+        <p:nvSpPr>
+          <p:cNvPr id="8" name="Rectangle à coins arrondis 7"/>
+          <p:cNvSpPr/>
+          <p:nvPr/>
+        </p:nvSpPr>
+        <p:spPr>
+          <a:xfrm>
+            <a:off x="3433881" y="5229200"/>
+            <a:ext cx="2348594" cy="1253964"/>
+          </a:xfrm>
+          <a:prstGeom prst="roundRect">
+            <a:avLst/>
+          </a:prstGeom>
+          <a:solidFill>
+            <a:schemeClr val="bg1">
+              <a:lumMod val="95000"/>
+            </a:schemeClr>
+          </a:solidFill>
+          <a:ln w="6350">
+            <a:solidFill>
+              <a:schemeClr val="tx2">
+                <a:lumMod val="20000"/>
+                <a:lumOff val="80000"/>
+              </a:schemeClr>
+            </a:solidFill>
+          </a:ln>
+        </p:spPr>
+        <p:style>
+          <a:lnRef idx="2">
+            <a:schemeClr val="accent1">
+              <a:shade val="50000"/>
+            </a:schemeClr>
+          </a:lnRef>
+          <a:fillRef idx="1">
+            <a:schemeClr val="accent1"/>
+          </a:fillRef>
+          <a:effectRef idx="0">
+            <a:schemeClr val="accent1"/>
+          </a:effectRef>
+          <a:fontRef idx="minor">
+            <a:schemeClr val="lt1"/>
+          </a:fontRef>
+        </p:style>
+        <p:txBody>
+          <a:bodyPr rtlCol="0" anchor="ctr"/>
+          <a:lstStyle/>
+          <a:p>
+            <a:pPr algn="ctr"/>
+            <a:r>
+              <a:rPr lang="fr-FR" sz="1600" dirty="0">
+                <a:solidFill>
+                  <a:schemeClr val="accent6">
+                    <a:lumMod val="75000"/>
+                  </a:schemeClr>
+                </a:solidFill>
+              </a:rPr>
+              <a:t>Adjoint à l'entraînement des </a:t>
+            </a:r>
+            <a:r>
+              <a:rPr lang="fr-FR" sz="1600" dirty="0" smtClean="0">
+                <a:solidFill>
+                  <a:schemeClr val="accent6">
+                    <a:lumMod val="75000"/>
+                  </a:schemeClr>
+                </a:solidFill>
+              </a:rPr>
+              <a:t>batteurs</a:t>
+            </a:r>
+          </a:p>
+          <a:p>
+            <a:pPr algn="ctr"/>
+            <a:r>
+              <a:rPr lang="fr-FR" sz="1600" dirty="0" smtClean="0">
+                <a:solidFill>
+                  <a:schemeClr val="tx1">
+                    <a:lumMod val="75000"/>
+                    <a:lumOff val="25000"/>
+                  </a:schemeClr>
+                </a:solidFill>
+              </a:rPr>
+              <a:t>-</a:t>
+            </a:r>
+            <a:endParaRPr lang="fr-FR" sz="1600" dirty="0" smtClean="0">
+              <a:solidFill>
+                <a:schemeClr val="tx1">
+                  <a:lumMod val="75000"/>
+                  <a:lumOff val="25000"/>
+                </a:schemeClr>
+              </a:solidFill>
+            </a:endParaRPr>
+          </a:p>
+          <a:p>
+            <a:pPr algn="ctr"/>
+            <a:r>
+              <a:rPr lang="fr-FR" sz="1600" b="1" dirty="0" smtClean="0">
+                <a:solidFill>
+                  <a:schemeClr val="accent1">
+                    <a:lumMod val="75000"/>
+                  </a:schemeClr>
+                </a:solidFill>
+              </a:rPr>
+              <a:t>Renaud Mortier</a:t>
+            </a:r>
+            <a:endParaRPr lang="fr-FR" sz="1600" b="1" dirty="0">
+              <a:solidFill>
+                <a:schemeClr val="accent1">
+                  <a:lumMod val="75000"/>
+                </a:schemeClr>
+              </a:solidFill>
+            </a:endParaRPr>
+          </a:p>
+        </p:txBody>
+      </p:sp>
+      <p:sp>
+        <p:nvSpPr>
+          <p:cNvPr id="13" name="Rectangle à coins arrondis 12"/>
+          <p:cNvSpPr/>
+          <p:nvPr/>
+        </p:nvSpPr>
+        <p:spPr>
+          <a:xfrm>
+            <a:off x="6372200" y="5229200"/>
+            <a:ext cx="2467136" cy="1253964"/>
+          </a:xfrm>
+          <a:prstGeom prst="roundRect">
+            <a:avLst/>
+          </a:prstGeom>
+          <a:solidFill>
+            <a:schemeClr val="bg1">
+              <a:lumMod val="95000"/>
+            </a:schemeClr>
+          </a:solidFill>
+          <a:ln w="6350">
+            <a:solidFill>
+              <a:schemeClr val="bg2">
+                <a:lumMod val="90000"/>
+              </a:schemeClr>
+            </a:solidFill>
+          </a:ln>
+        </p:spPr>
+        <p:style>
+          <a:lnRef idx="2">
+            <a:schemeClr val="accent1">
+              <a:shade val="50000"/>
+            </a:schemeClr>
+          </a:lnRef>
+          <a:fillRef idx="1">
+            <a:schemeClr val="accent1"/>
+          </a:fillRef>
+          <a:effectRef idx="0">
+            <a:schemeClr val="accent1"/>
+          </a:effectRef>
+          <a:fontRef idx="minor">
+            <a:schemeClr val="lt1"/>
+          </a:fontRef>
+        </p:style>
+        <p:txBody>
+          <a:bodyPr rtlCol="0" anchor="ctr"/>
+          <a:lstStyle/>
+          <a:p>
+            <a:pPr algn="ctr"/>
+            <a:endParaRPr lang="fr-FR" sz="1600" dirty="0" smtClean="0">
+              <a:solidFill>
+                <a:schemeClr val="tx1">
+                  <a:lumMod val="75000"/>
+                  <a:lumOff val="25000"/>
+                </a:schemeClr>
+              </a:solidFill>
+            </a:endParaRPr>
+          </a:p>
+          <a:p>
+            <a:pPr algn="ctr"/>
+            <a:r>
+              <a:rPr lang="fr-FR" sz="1600" dirty="0">
+                <a:solidFill>
+                  <a:schemeClr val="accent6">
+                    <a:lumMod val="75000"/>
+                  </a:schemeClr>
+                </a:solidFill>
+              </a:rPr>
+              <a:t>Adjoint à l'entraînement des </a:t>
+            </a:r>
+            <a:r>
+              <a:rPr lang="fr-FR" sz="1600" dirty="0" smtClean="0">
+                <a:solidFill>
+                  <a:schemeClr val="accent6">
+                    <a:lumMod val="75000"/>
+                  </a:schemeClr>
+                </a:solidFill>
+              </a:rPr>
+              <a:t>poursuiveurs</a:t>
+            </a:r>
+          </a:p>
+          <a:p>
+            <a:pPr algn="ctr"/>
+            <a:r>
+              <a:rPr lang="fr-FR" sz="1600" dirty="0" smtClean="0">
+                <a:solidFill>
+                  <a:schemeClr val="tx1">
+                    <a:lumMod val="75000"/>
+                    <a:lumOff val="25000"/>
+                  </a:schemeClr>
+                </a:solidFill>
+              </a:rPr>
+              <a:t>-</a:t>
+            </a:r>
+            <a:endParaRPr lang="fr-FR" sz="1600" dirty="0" smtClean="0">
+              <a:solidFill>
+                <a:schemeClr val="tx1">
+                  <a:lumMod val="75000"/>
+                  <a:lumOff val="25000"/>
+                </a:schemeClr>
+              </a:solidFill>
+            </a:endParaRPr>
+          </a:p>
+          <a:p>
+            <a:pPr algn="ctr"/>
+            <a:r>
+              <a:rPr lang="fr-FR" sz="1600" b="1" dirty="0" smtClean="0">
+                <a:solidFill>
+                  <a:schemeClr val="accent1">
+                    <a:lumMod val="75000"/>
+                  </a:schemeClr>
+                </a:solidFill>
+              </a:rPr>
+              <a:t>Alexandre P</a:t>
+            </a:r>
+            <a:endParaRPr lang="fr-FR" sz="1600" b="1" dirty="0" smtClean="0">
+              <a:solidFill>
+                <a:schemeClr val="accent1">
+                  <a:lumMod val="75000"/>
+                </a:schemeClr>
+              </a:solidFill>
+            </a:endParaRPr>
+          </a:p>
+          <a:p>
+            <a:pPr algn="ctr"/>
+            <a:endParaRPr lang="fr-FR" dirty="0" smtClean="0">
+              <a:solidFill>
+                <a:schemeClr val="tx1">
+                  <a:lumMod val="75000"/>
+                  <a:lumOff val="25000"/>
+                </a:schemeClr>
+              </a:solidFill>
+            </a:endParaRPr>
+          </a:p>
+        </p:txBody>
+      </p:sp>
+      <p:sp>
+        <p:nvSpPr>
+          <p:cNvPr id="14" name="Rectangle à coins arrondis 13"/>
+          <p:cNvSpPr/>
+          <p:nvPr/>
+        </p:nvSpPr>
+        <p:spPr>
+          <a:xfrm>
+            <a:off x="363960" y="5229200"/>
+            <a:ext cx="2407840" cy="1253964"/>
+          </a:xfrm>
+          <a:prstGeom prst="roundRect">
+            <a:avLst/>
+          </a:prstGeom>
+          <a:solidFill>
+            <a:schemeClr val="bg1">
+              <a:lumMod val="95000"/>
+            </a:schemeClr>
+          </a:solidFill>
+          <a:ln w="6350">
+            <a:solidFill>
+              <a:schemeClr val="tx2">
+                <a:lumMod val="20000"/>
+                <a:lumOff val="80000"/>
+              </a:schemeClr>
+            </a:solidFill>
+          </a:ln>
+        </p:spPr>
+        <p:style>
+          <a:lnRef idx="2">
+            <a:schemeClr val="accent1">
+              <a:shade val="50000"/>
+            </a:schemeClr>
+          </a:lnRef>
+          <a:fillRef idx="1">
+            <a:schemeClr val="accent1"/>
+          </a:fillRef>
+          <a:effectRef idx="0">
+            <a:schemeClr val="accent1"/>
+          </a:effectRef>
+          <a:fontRef idx="minor">
+            <a:schemeClr val="lt1"/>
+          </a:fontRef>
+        </p:style>
+        <p:txBody>
+          <a:bodyPr rtlCol="0" anchor="ctr"/>
+          <a:lstStyle/>
+          <a:p>
+            <a:pPr algn="ctr"/>
+            <a:r>
+              <a:rPr lang="fr-FR" sz="1600" dirty="0">
+                <a:solidFill>
+                  <a:schemeClr val="accent6">
+                    <a:lumMod val="75000"/>
+                  </a:schemeClr>
+                </a:solidFill>
+              </a:rPr>
+              <a:t>Adjoint à l'entraînement des </a:t>
+            </a:r>
+            <a:r>
+              <a:rPr lang="fr-FR" sz="1600" dirty="0" smtClean="0">
+                <a:solidFill>
+                  <a:schemeClr val="accent6">
+                    <a:lumMod val="75000"/>
+                  </a:schemeClr>
+                </a:solidFill>
+              </a:rPr>
+              <a:t>gardiens</a:t>
+            </a:r>
+          </a:p>
+          <a:p>
+            <a:pPr algn="ctr"/>
+            <a:r>
+              <a:rPr lang="fr-FR" dirty="0" smtClean="0">
+                <a:solidFill>
+                  <a:schemeClr val="tx1">
+                    <a:lumMod val="75000"/>
+                    <a:lumOff val="25000"/>
+                  </a:schemeClr>
+                </a:solidFill>
+              </a:rPr>
+              <a:t>-</a:t>
+            </a:r>
+          </a:p>
+          <a:p>
+            <a:pPr algn="ctr"/>
+            <a:r>
+              <a:rPr lang="fr-FR" sz="1600" b="1" dirty="0" smtClean="0">
+                <a:solidFill>
+                  <a:schemeClr val="accent1">
+                    <a:lumMod val="75000"/>
+                  </a:schemeClr>
+                </a:solidFill>
+              </a:rPr>
+              <a:t>Thibaut </a:t>
+            </a:r>
+            <a:r>
+              <a:rPr lang="fr-FR" sz="1600" b="1" dirty="0" err="1" smtClean="0">
+                <a:solidFill>
+                  <a:schemeClr val="accent1">
+                    <a:lumMod val="75000"/>
+                  </a:schemeClr>
+                </a:solidFill>
+              </a:rPr>
+              <a:t>Chaize</a:t>
+            </a:r>
+            <a:endParaRPr lang="fr-FR" sz="1600" b="1" dirty="0">
+              <a:solidFill>
+                <a:schemeClr val="accent1">
+                  <a:lumMod val="75000"/>
+                </a:schemeClr>
+              </a:solidFill>
+            </a:endParaRPr>
+          </a:p>
+        </p:txBody>
+      </p:sp>
+      <p:sp>
+        <p:nvSpPr>
+          <p:cNvPr id="15" name="Rectangle à coins arrondis 14"/>
+          <p:cNvSpPr/>
+          <p:nvPr/>
+        </p:nvSpPr>
+        <p:spPr>
+          <a:xfrm>
+            <a:off x="3618043" y="224880"/>
+            <a:ext cx="2160240" cy="1215628"/>
+          </a:xfrm>
+          <a:prstGeom prst="roundRect">
+            <a:avLst/>
+          </a:prstGeom>
+          <a:solidFill>
+            <a:schemeClr val="bg1">
+              <a:lumMod val="95000"/>
+            </a:schemeClr>
+          </a:solidFill>
+          <a:ln w="6350">
+            <a:solidFill>
+              <a:schemeClr val="tx2">
+                <a:lumMod val="20000"/>
+                <a:lumOff val="80000"/>
+              </a:schemeClr>
+            </a:solidFill>
+          </a:ln>
+        </p:spPr>
+        <p:style>
+          <a:lnRef idx="2">
+            <a:schemeClr val="accent1">
+              <a:shade val="50000"/>
+            </a:schemeClr>
+          </a:lnRef>
+          <a:fillRef idx="1">
+            <a:schemeClr val="accent1"/>
+          </a:fillRef>
+          <a:effectRef idx="0">
+            <a:schemeClr val="accent1"/>
+          </a:effectRef>
+          <a:fontRef idx="minor">
+            <a:schemeClr val="lt1"/>
+          </a:fontRef>
+        </p:style>
+        <p:txBody>
+          <a:bodyPr rtlCol="0" anchor="ctr"/>
+          <a:lstStyle/>
+          <a:p>
+            <a:pPr algn="ctr"/>
+            <a:endParaRPr lang="fr-FR" sz="1600" dirty="0" smtClean="0">
+              <a:solidFill>
+                <a:schemeClr val="tx1">
+                  <a:lumMod val="75000"/>
+                  <a:lumOff val="25000"/>
+                </a:schemeClr>
+              </a:solidFill>
+            </a:endParaRPr>
+          </a:p>
+          <a:p>
+            <a:pPr algn="ctr"/>
+            <a:r>
+              <a:rPr lang="fr-FR" sz="1600" dirty="0">
+                <a:solidFill>
+                  <a:schemeClr val="accent6">
+                    <a:lumMod val="75000"/>
+                  </a:schemeClr>
+                </a:solidFill>
+              </a:rPr>
+              <a:t>Adjoint à la préparation </a:t>
+            </a:r>
+            <a:r>
+              <a:rPr lang="fr-FR" sz="1600" dirty="0" smtClean="0">
+                <a:solidFill>
+                  <a:schemeClr val="accent6">
+                    <a:lumMod val="75000"/>
+                  </a:schemeClr>
+                </a:solidFill>
+              </a:rPr>
+              <a:t>physique</a:t>
+            </a:r>
+          </a:p>
+          <a:p>
+            <a:pPr algn="ctr"/>
+            <a:r>
+              <a:rPr lang="fr-FR" sz="1600" dirty="0" smtClean="0">
+                <a:solidFill>
+                  <a:schemeClr val="tx1">
+                    <a:lumMod val="75000"/>
+                    <a:lumOff val="25000"/>
+                  </a:schemeClr>
+                </a:solidFill>
+              </a:rPr>
+              <a:t>-</a:t>
+            </a:r>
+            <a:endParaRPr lang="fr-FR" sz="1600" dirty="0" smtClean="0">
+              <a:solidFill>
+                <a:schemeClr val="tx1">
+                  <a:lumMod val="75000"/>
+                  <a:lumOff val="25000"/>
+                </a:schemeClr>
+              </a:solidFill>
+            </a:endParaRPr>
+          </a:p>
+          <a:p>
+            <a:pPr algn="ctr"/>
+            <a:r>
+              <a:rPr lang="fr-FR" sz="1600" b="1" dirty="0" smtClean="0">
+                <a:solidFill>
+                  <a:schemeClr val="accent1">
+                    <a:lumMod val="75000"/>
+                  </a:schemeClr>
+                </a:solidFill>
+              </a:rPr>
+              <a:t>Renaud Mortier</a:t>
+            </a:r>
+            <a:endParaRPr lang="fr-FR" sz="1600" b="1" dirty="0" smtClean="0">
+              <a:solidFill>
+                <a:schemeClr val="accent1">
+                  <a:lumMod val="75000"/>
+                </a:schemeClr>
+              </a:solidFill>
+            </a:endParaRPr>
+          </a:p>
+          <a:p>
+            <a:pPr algn="ctr"/>
+            <a:endParaRPr lang="fr-FR" dirty="0" smtClean="0">
+              <a:solidFill>
+                <a:schemeClr val="tx1">
+                  <a:lumMod val="75000"/>
+                  <a:lumOff val="25000"/>
+                </a:schemeClr>
+              </a:solidFill>
+            </a:endParaRPr>
+          </a:p>
+        </p:txBody>
+      </p:sp>
+      <p:sp>
+        <p:nvSpPr>
+          <p:cNvPr id="16" name="Rectangle à coins arrondis 15"/>
+          <p:cNvSpPr/>
+          <p:nvPr/>
+        </p:nvSpPr>
+        <p:spPr>
+          <a:xfrm>
+            <a:off x="6723670" y="256332"/>
+            <a:ext cx="1944216" cy="1157312"/>
+          </a:xfrm>
+          <a:prstGeom prst="roundRect">
+            <a:avLst/>
+          </a:prstGeom>
+          <a:solidFill>
+            <a:schemeClr val="bg1">
+              <a:lumMod val="95000"/>
+            </a:schemeClr>
+          </a:solidFill>
+          <a:ln w="6350">
+            <a:solidFill>
+              <a:schemeClr val="tx2">
+                <a:lumMod val="20000"/>
+                <a:lumOff val="80000"/>
+              </a:schemeClr>
+            </a:solidFill>
+          </a:ln>
+        </p:spPr>
+        <p:style>
+          <a:lnRef idx="2">
+            <a:schemeClr val="accent1">
+              <a:shade val="50000"/>
+            </a:schemeClr>
+          </a:lnRef>
+          <a:fillRef idx="1">
+            <a:schemeClr val="accent1"/>
+          </a:fillRef>
+          <a:effectRef idx="0">
+            <a:schemeClr val="accent1"/>
+          </a:effectRef>
+          <a:fontRef idx="minor">
+            <a:schemeClr val="lt1"/>
+          </a:fontRef>
+        </p:style>
+        <p:txBody>
+          <a:bodyPr rtlCol="0" anchor="ctr"/>
+          <a:lstStyle/>
+          <a:p>
+            <a:pPr algn="ctr"/>
+            <a:endParaRPr lang="fr-FR" sz="1600" dirty="0" smtClean="0">
+              <a:solidFill>
+                <a:schemeClr val="tx1">
+                  <a:lumMod val="75000"/>
+                  <a:lumOff val="25000"/>
+                </a:schemeClr>
+              </a:solidFill>
+            </a:endParaRPr>
+          </a:p>
+          <a:p>
+            <a:pPr algn="ctr"/>
+            <a:r>
+              <a:rPr lang="fr-FR" sz="1600" dirty="0">
+                <a:solidFill>
+                  <a:schemeClr val="accent6">
+                    <a:lumMod val="75000"/>
+                  </a:schemeClr>
+                </a:solidFill>
+              </a:rPr>
+              <a:t>Adjoint à l'analyse </a:t>
+            </a:r>
+            <a:r>
+              <a:rPr lang="fr-FR" sz="1600" dirty="0" smtClean="0">
+                <a:solidFill>
+                  <a:schemeClr val="accent6">
+                    <a:lumMod val="75000"/>
+                  </a:schemeClr>
+                </a:solidFill>
+              </a:rPr>
+              <a:t>tactique</a:t>
+            </a:r>
+          </a:p>
+          <a:p>
+            <a:pPr algn="ctr"/>
+            <a:r>
+              <a:rPr lang="fr-FR" sz="1600" dirty="0" smtClean="0">
+                <a:solidFill>
+                  <a:schemeClr val="tx1">
+                    <a:lumMod val="75000"/>
+                    <a:lumOff val="25000"/>
+                  </a:schemeClr>
+                </a:solidFill>
+              </a:rPr>
+              <a:t>-</a:t>
+            </a:r>
+            <a:endParaRPr lang="fr-FR" sz="1600" dirty="0" smtClean="0">
+              <a:solidFill>
+                <a:schemeClr val="tx1">
+                  <a:lumMod val="75000"/>
+                  <a:lumOff val="25000"/>
+                </a:schemeClr>
+              </a:solidFill>
+            </a:endParaRPr>
+          </a:p>
+          <a:p>
+            <a:pPr algn="ctr"/>
+            <a:r>
+              <a:rPr lang="fr-FR" sz="1600" b="1" dirty="0" smtClean="0">
+                <a:solidFill>
+                  <a:schemeClr val="accent1">
+                    <a:lumMod val="75000"/>
+                  </a:schemeClr>
+                </a:solidFill>
+              </a:rPr>
+              <a:t>Emmanuel </a:t>
+            </a:r>
+            <a:r>
+              <a:rPr lang="fr-FR" sz="1600" b="1" dirty="0" err="1" smtClean="0">
+                <a:solidFill>
+                  <a:schemeClr val="accent1">
+                    <a:lumMod val="75000"/>
+                  </a:schemeClr>
+                </a:solidFill>
+              </a:rPr>
+              <a:t>Halter</a:t>
+            </a:r>
+            <a:endParaRPr lang="fr-FR" sz="1600" b="1" dirty="0" smtClean="0">
+              <a:solidFill>
+                <a:schemeClr val="accent1">
+                  <a:lumMod val="75000"/>
+                </a:schemeClr>
+              </a:solidFill>
+            </a:endParaRPr>
+          </a:p>
+          <a:p>
+            <a:pPr algn="ctr"/>
+            <a:endParaRPr lang="fr-FR" dirty="0" smtClean="0">
+              <a:solidFill>
+                <a:schemeClr val="tx1">
+                  <a:lumMod val="75000"/>
+                  <a:lumOff val="25000"/>
+                </a:schemeClr>
+              </a:solidFill>
+            </a:endParaRPr>
+          </a:p>
+        </p:txBody>
+      </p:sp>
+      <p:cxnSp>
+        <p:nvCxnSpPr>
+          <p:cNvPr id="44" name="Connecteur droit 43"/>
+          <p:cNvCxnSpPr>
+            <a:stCxn id="7" idx="2"/>
+            <a:endCxn id="4" idx="1"/>
+          </p:cNvCxnSpPr>
+          <p:nvPr/>
+        </p:nvCxnSpPr>
+        <p:spPr>
+          <a:xfrm>
+            <a:off x="1759856" y="1476276"/>
+            <a:ext cx="1951043" cy="2005496"/>
+          </a:xfrm>
+          <a:prstGeom prst="line">
+            <a:avLst/>
+          </a:prstGeom>
+        </p:spPr>
+        <p:style>
+          <a:lnRef idx="1">
+            <a:schemeClr val="accent1"/>
+          </a:lnRef>
+          <a:fillRef idx="0">
+            <a:schemeClr val="accent1"/>
+          </a:fillRef>
+          <a:effectRef idx="0">
+            <a:schemeClr val="accent1"/>
+          </a:effectRef>
+          <a:fontRef idx="minor">
+            <a:schemeClr val="tx1"/>
+          </a:fontRef>
+        </p:style>
+      </p:cxnSp>
+      <p:cxnSp>
+        <p:nvCxnSpPr>
+          <p:cNvPr id="58" name="Connecteur droit 57"/>
+          <p:cNvCxnSpPr>
+            <a:stCxn id="15" idx="2"/>
+            <a:endCxn id="4" idx="0"/>
+          </p:cNvCxnSpPr>
+          <p:nvPr/>
+        </p:nvCxnSpPr>
+        <p:spPr>
+          <a:xfrm>
+            <a:off x="4698163" y="1440508"/>
+            <a:ext cx="0" cy="1573212"/>
+          </a:xfrm>
+          <a:prstGeom prst="line">
+            <a:avLst/>
+          </a:prstGeom>
+        </p:spPr>
+        <p:style>
+          <a:lnRef idx="1">
+            <a:schemeClr val="accent1"/>
+          </a:lnRef>
+          <a:fillRef idx="0">
+            <a:schemeClr val="accent1"/>
+          </a:fillRef>
+          <a:effectRef idx="0">
+            <a:schemeClr val="accent1"/>
+          </a:effectRef>
+          <a:fontRef idx="minor">
+            <a:schemeClr val="tx1"/>
+          </a:fontRef>
+        </p:style>
+      </p:cxnSp>
+      <p:cxnSp>
+        <p:nvCxnSpPr>
+          <p:cNvPr id="61" name="Connecteur droit 60"/>
+          <p:cNvCxnSpPr>
+            <a:stCxn id="16" idx="2"/>
+            <a:endCxn id="4" idx="3"/>
+          </p:cNvCxnSpPr>
+          <p:nvPr/>
+        </p:nvCxnSpPr>
+        <p:spPr>
+          <a:xfrm flipH="1">
+            <a:off x="5685427" y="1413644"/>
+            <a:ext cx="2010351" cy="2068128"/>
+          </a:xfrm>
+          <a:prstGeom prst="line">
+            <a:avLst/>
+          </a:prstGeom>
+        </p:spPr>
+        <p:style>
+          <a:lnRef idx="1">
+            <a:schemeClr val="accent1"/>
+          </a:lnRef>
+          <a:fillRef idx="0">
+            <a:schemeClr val="accent1"/>
+          </a:fillRef>
+          <a:effectRef idx="0">
+            <a:schemeClr val="accent1"/>
+          </a:effectRef>
+          <a:fontRef idx="minor">
+            <a:schemeClr val="tx1"/>
+          </a:fontRef>
+        </p:style>
+      </p:cxnSp>
+      <p:cxnSp>
+        <p:nvCxnSpPr>
+          <p:cNvPr id="65" name="Connecteur droit 64"/>
+          <p:cNvCxnSpPr>
+            <a:stCxn id="14" idx="0"/>
+            <a:endCxn id="4" idx="1"/>
+          </p:cNvCxnSpPr>
+          <p:nvPr/>
+        </p:nvCxnSpPr>
+        <p:spPr>
+          <a:xfrm flipV="1">
+            <a:off x="1567880" y="3481772"/>
+            <a:ext cx="2143019" cy="1747428"/>
+          </a:xfrm>
+          <a:prstGeom prst="line">
+            <a:avLst/>
+          </a:prstGeom>
+        </p:spPr>
+        <p:style>
+          <a:lnRef idx="1">
+            <a:schemeClr val="accent1"/>
+          </a:lnRef>
+          <a:fillRef idx="0">
+            <a:schemeClr val="accent1"/>
+          </a:fillRef>
+          <a:effectRef idx="0">
+            <a:schemeClr val="accent1"/>
+          </a:effectRef>
+          <a:fontRef idx="minor">
+            <a:schemeClr val="tx1"/>
+          </a:fontRef>
+        </p:style>
+      </p:cxnSp>
+      <p:cxnSp>
+        <p:nvCxnSpPr>
+          <p:cNvPr id="67" name="Connecteur droit 66"/>
+          <p:cNvCxnSpPr>
+            <a:stCxn id="8" idx="0"/>
+            <a:endCxn id="4" idx="2"/>
+          </p:cNvCxnSpPr>
+          <p:nvPr/>
+        </p:nvCxnSpPr>
+        <p:spPr>
+          <a:xfrm flipV="1">
+            <a:off x="4608178" y="3949824"/>
+            <a:ext cx="89985" cy="1279376"/>
+          </a:xfrm>
+          <a:prstGeom prst="line">
+            <a:avLst/>
+          </a:prstGeom>
+        </p:spPr>
+        <p:style>
+          <a:lnRef idx="1">
+            <a:schemeClr val="accent1"/>
+          </a:lnRef>
+          <a:fillRef idx="0">
+            <a:schemeClr val="accent1"/>
+          </a:fillRef>
+          <a:effectRef idx="0">
+            <a:schemeClr val="accent1"/>
+          </a:effectRef>
+          <a:fontRef idx="minor">
+            <a:schemeClr val="tx1"/>
+          </a:fontRef>
+        </p:style>
+      </p:cxnSp>
+      <p:cxnSp>
+        <p:nvCxnSpPr>
+          <p:cNvPr id="79" name="Connecteur droit 78"/>
+          <p:cNvCxnSpPr>
+            <a:stCxn id="13" idx="0"/>
+            <a:endCxn id="4" idx="3"/>
+          </p:cNvCxnSpPr>
+          <p:nvPr/>
+        </p:nvCxnSpPr>
+        <p:spPr>
+          <a:xfrm flipH="1" flipV="1">
+            <a:off x="5685427" y="3481772"/>
+            <a:ext cx="1920341" cy="1747428"/>
+          </a:xfrm>
+          <a:prstGeom prst="line">
+            <a:avLst/>
+          </a:prstGeom>
+        </p:spPr>
+        <p:style>
+          <a:lnRef idx="1">
+            <a:schemeClr val="accent1"/>
+          </a:lnRef>
+          <a:fillRef idx="0">
+            <a:schemeClr val="accent1"/>
+          </a:fillRef>
+          <a:effectRef idx="0">
+            <a:schemeClr val="accent1"/>
+          </a:effectRef>
+          <a:fontRef idx="minor">
+            <a:schemeClr val="tx1"/>
+          </a:fontRef>
+        </p:style>
+      </p:cxnSp>
+    </p:spTree>
+    <p:extLst>
+      <p:ext uri="{BB962C8B-B14F-4D97-AF65-F5344CB8AC3E}">
+        <p14:creationId xmlns:p14="http://schemas.microsoft.com/office/powerpoint/2010/main" val="2386997686"/>
       </p:ext>
     </p:extLst>
   </p:cSld>

</xml_diff>